<commit_message>
Some final slide updates.
</commit_message>
<xml_diff>
--- a/Presentations/Building Modern Mobile Apps - Xamarin.Forms.pptx
+++ b/Presentations/Building Modern Mobile Apps - Xamarin.Forms.pptx
@@ -6,10 +6,10 @@
     <p:sldMasterId id="2147483682" r:id="rId2"/>
   </p:sldMasterIdLst>
   <p:notesMasterIdLst>
-    <p:notesMasterId r:id="rId47"/>
+    <p:notesMasterId r:id="rId48"/>
   </p:notesMasterIdLst>
   <p:handoutMasterIdLst>
-    <p:handoutMasterId r:id="rId48"/>
+    <p:handoutMasterId r:id="rId49"/>
   </p:handoutMasterIdLst>
   <p:sldIdLst>
     <p:sldId id="258" r:id="rId3"/>
@@ -47,15 +47,16 @@
     <p:sldId id="282" r:id="rId35"/>
     <p:sldId id="283" r:id="rId36"/>
     <p:sldId id="284" r:id="rId37"/>
-    <p:sldId id="268" r:id="rId38"/>
-    <p:sldId id="267" r:id="rId39"/>
-    <p:sldId id="269" r:id="rId40"/>
-    <p:sldId id="309" r:id="rId41"/>
-    <p:sldId id="302" r:id="rId42"/>
-    <p:sldId id="303" r:id="rId43"/>
-    <p:sldId id="304" r:id="rId44"/>
-    <p:sldId id="305" r:id="rId45"/>
-    <p:sldId id="308" r:id="rId46"/>
+    <p:sldId id="310" r:id="rId38"/>
+    <p:sldId id="268" r:id="rId39"/>
+    <p:sldId id="267" r:id="rId40"/>
+    <p:sldId id="269" r:id="rId41"/>
+    <p:sldId id="309" r:id="rId42"/>
+    <p:sldId id="302" r:id="rId43"/>
+    <p:sldId id="303" r:id="rId44"/>
+    <p:sldId id="304" r:id="rId45"/>
+    <p:sldId id="305" r:id="rId46"/>
+    <p:sldId id="308" r:id="rId47"/>
   </p:sldIdLst>
   <p:sldSz cx="9144000" cy="5143500" type="screen16x9"/>
   <p:notesSz cx="6858000" cy="9144000"/>
@@ -33232,6 +33233,121 @@
           <a:lstStyle/>
           <a:p>
             <a:r>
+              <a:rPr lang="en-US" smtClean="0"/>
+              <a:t>MVVM</a:t>
+            </a:r>
+            <a:endParaRPr lang="en-US" dirty="0"/>
+          </a:p>
+        </p:txBody>
+      </p:sp>
+      <p:sp>
+        <p:nvSpPr>
+          <p:cNvPr id="3" name="Text Placeholder 2"/>
+          <p:cNvSpPr>
+            <a:spLocks noGrp="1"/>
+          </p:cNvSpPr>
+          <p:nvPr>
+            <p:ph type="body" idx="1"/>
+          </p:nvPr>
+        </p:nvSpPr>
+        <p:spPr/>
+        <p:txBody>
+          <a:bodyPr/>
+          <a:lstStyle/>
+          <a:p>
+            <a:r>
+              <a:rPr lang="en-US" dirty="0">
+                <a:solidFill>
+                  <a:schemeClr val="bg1"/>
+                </a:solidFill>
+              </a:rPr>
+              <a:t>[</a:t>
+            </a:r>
+            <a:r>
+              <a:rPr lang="en-US" dirty="0">
+                <a:solidFill>
+                  <a:srgbClr val="FF6600"/>
+                </a:solidFill>
+              </a:rPr>
+              <a:t>DEMO</a:t>
+            </a:r>
+            <a:r>
+              <a:rPr lang="en-US" dirty="0" smtClean="0">
+                <a:solidFill>
+                  <a:schemeClr val="bg1"/>
+                </a:solidFill>
+              </a:rPr>
+              <a:t>]</a:t>
+            </a:r>
+            <a:endParaRPr lang="en-US" dirty="0">
+              <a:solidFill>
+                <a:schemeClr val="bg1"/>
+              </a:solidFill>
+            </a:endParaRPr>
+          </a:p>
+        </p:txBody>
+      </p:sp>
+    </p:spTree>
+    <p:extLst>
+      <p:ext uri="{BB962C8B-B14F-4D97-AF65-F5344CB8AC3E}">
+        <p14:creationId xmlns:p14="http://schemas.microsoft.com/office/powerpoint/2010/main" val="991815287"/>
+      </p:ext>
+    </p:extLst>
+  </p:cSld>
+  <p:clrMapOvr>
+    <a:masterClrMapping/>
+  </p:clrMapOvr>
+  <mc:AlternateContent xmlns:mc="http://schemas.openxmlformats.org/markup-compatibility/2006" xmlns:p14="http://schemas.microsoft.com/office/powerpoint/2010/main">
+    <mc:Choice Requires="p14">
+      <p:transition spd="slow" p14:dur="2000"/>
+    </mc:Choice>
+    <mc:Fallback xmlns="">
+      <p:transition spd="slow"/>
+    </mc:Fallback>
+  </mc:AlternateContent>
+  <p:timing>
+    <p:tnLst>
+      <p:par>
+        <p:cTn id="1" dur="indefinite" restart="never" nodeType="tmRoot"/>
+      </p:par>
+    </p:tnLst>
+  </p:timing>
+</p:sld>
+</file>
+
+<file path=ppt/slides/slide37.xml><?xml version="1.0" encoding="utf-8"?>
+<p:sld xmlns:a="http://schemas.openxmlformats.org/drawingml/2006/main" xmlns:r="http://schemas.openxmlformats.org/officeDocument/2006/relationships" xmlns:p="http://schemas.openxmlformats.org/presentationml/2006/main">
+  <p:cSld>
+    <p:spTree>
+      <p:nvGrpSpPr>
+        <p:cNvPr id="1" name=""/>
+        <p:cNvGrpSpPr/>
+        <p:nvPr/>
+      </p:nvGrpSpPr>
+      <p:grpSpPr>
+        <a:xfrm>
+          <a:off x="0" y="0"/>
+          <a:ext cx="0" cy="0"/>
+          <a:chOff x="0" y="0"/>
+          <a:chExt cx="0" cy="0"/>
+        </a:xfrm>
+      </p:grpSpPr>
+      <p:sp>
+        <p:nvSpPr>
+          <p:cNvPr id="2" name="Title 1"/>
+          <p:cNvSpPr>
+            <a:spLocks noGrp="1"/>
+          </p:cNvSpPr>
+          <p:nvPr>
+            <p:ph type="title"/>
+          </p:nvPr>
+        </p:nvSpPr>
+        <p:spPr/>
+        <p:txBody>
+          <a:bodyPr/>
+          <a:lstStyle/>
+          <a:p>
+            <a:r>
               <a:rPr lang="en-US" dirty="0" smtClean="0"/>
               <a:t>Application Lifecycle</a:t>
             </a:r>
@@ -33615,7 +33731,7 @@
 </p:sld>
 </file>
 
-<file path=ppt/slides/slide37.xml><?xml version="1.0" encoding="utf-8"?>
+<file path=ppt/slides/slide38.xml><?xml version="1.0" encoding="utf-8"?>
 <p:sld xmlns:a="http://schemas.openxmlformats.org/drawingml/2006/main" xmlns:r="http://schemas.openxmlformats.org/officeDocument/2006/relationships" xmlns:p="http://schemas.openxmlformats.org/presentationml/2006/main">
   <p:cSld>
     <p:spTree>
@@ -33935,7 +34051,7 @@
 </p:sld>
 </file>
 
-<file path=ppt/slides/slide38.xml><?xml version="1.0" encoding="utf-8"?>
+<file path=ppt/slides/slide39.xml><?xml version="1.0" encoding="utf-8"?>
 <p:sld xmlns:a="http://schemas.openxmlformats.org/drawingml/2006/main" xmlns:r="http://schemas.openxmlformats.org/officeDocument/2006/relationships" xmlns:p="http://schemas.openxmlformats.org/presentationml/2006/main">
   <p:cSld>
     <p:spTree>
@@ -34303,89 +34419,6 @@
 </p:sld>
 </file>
 
-<file path=ppt/slides/slide39.xml><?xml version="1.0" encoding="utf-8"?>
-<p:sld xmlns:a="http://schemas.openxmlformats.org/drawingml/2006/main" xmlns:r="http://schemas.openxmlformats.org/officeDocument/2006/relationships" xmlns:p="http://schemas.openxmlformats.org/presentationml/2006/main">
-  <p:cSld>
-    <p:spTree>
-      <p:nvGrpSpPr>
-        <p:cNvPr id="1" name=""/>
-        <p:cNvGrpSpPr/>
-        <p:nvPr/>
-      </p:nvGrpSpPr>
-      <p:grpSpPr>
-        <a:xfrm>
-          <a:off x="0" y="0"/>
-          <a:ext cx="0" cy="0"/>
-          <a:chOff x="0" y="0"/>
-          <a:chExt cx="0" cy="0"/>
-        </a:xfrm>
-      </p:grpSpPr>
-      <p:sp>
-        <p:nvSpPr>
-          <p:cNvPr id="4" name="Title 3"/>
-          <p:cNvSpPr>
-            <a:spLocks noGrp="1"/>
-          </p:cNvSpPr>
-          <p:nvPr>
-            <p:ph type="title"/>
-          </p:nvPr>
-        </p:nvSpPr>
-        <p:spPr/>
-        <p:txBody>
-          <a:bodyPr/>
-          <a:lstStyle/>
-          <a:p>
-            <a:r>
-              <a:rPr lang="en-US" dirty="0" smtClean="0"/>
-              <a:t>Thoughts on </a:t>
-            </a:r>
-            <a:r>
-              <a:rPr lang="en-US" dirty="0" err="1" smtClean="0"/>
-              <a:t>Xamarin.Forms</a:t>
-            </a:r>
-            <a:endParaRPr lang="en-US" dirty="0"/>
-          </a:p>
-        </p:txBody>
-      </p:sp>
-      <p:sp>
-        <p:nvSpPr>
-          <p:cNvPr id="5" name="Text Placeholder 4"/>
-          <p:cNvSpPr>
-            <a:spLocks noGrp="1"/>
-          </p:cNvSpPr>
-          <p:nvPr>
-            <p:ph type="body" idx="1"/>
-          </p:nvPr>
-        </p:nvSpPr>
-        <p:spPr/>
-        <p:txBody>
-          <a:bodyPr/>
-          <a:lstStyle/>
-          <a:p>
-            <a:endParaRPr lang="en-US"/>
-          </a:p>
-        </p:txBody>
-      </p:sp>
-    </p:spTree>
-    <p:extLst>
-      <p:ext uri="{BB962C8B-B14F-4D97-AF65-F5344CB8AC3E}">
-        <p14:creationId xmlns:p14="http://schemas.microsoft.com/office/powerpoint/2010/main" val="3653969678"/>
-      </p:ext>
-    </p:extLst>
-  </p:cSld>
-  <p:clrMapOvr>
-    <a:masterClrMapping/>
-  </p:clrMapOvr>
-  <p:timing>
-    <p:tnLst>
-      <p:par>
-        <p:cTn id="1" dur="indefinite" restart="never" nodeType="tmRoot"/>
-      </p:par>
-    </p:tnLst>
-  </p:timing>
-</p:sld>
-</file>
-
 <file path=ppt/slides/slide4.xml><?xml version="1.0" encoding="utf-8"?>
 <p:sld xmlns:a="http://schemas.openxmlformats.org/drawingml/2006/main" xmlns:r="http://schemas.openxmlformats.org/officeDocument/2006/relationships" xmlns:p="http://schemas.openxmlformats.org/presentationml/2006/main">
   <p:cSld>
@@ -34474,6 +34507,89 @@
 </file>
 
 <file path=ppt/slides/slide40.xml><?xml version="1.0" encoding="utf-8"?>
+<p:sld xmlns:a="http://schemas.openxmlformats.org/drawingml/2006/main" xmlns:r="http://schemas.openxmlformats.org/officeDocument/2006/relationships" xmlns:p="http://schemas.openxmlformats.org/presentationml/2006/main">
+  <p:cSld>
+    <p:spTree>
+      <p:nvGrpSpPr>
+        <p:cNvPr id="1" name=""/>
+        <p:cNvGrpSpPr/>
+        <p:nvPr/>
+      </p:nvGrpSpPr>
+      <p:grpSpPr>
+        <a:xfrm>
+          <a:off x="0" y="0"/>
+          <a:ext cx="0" cy="0"/>
+          <a:chOff x="0" y="0"/>
+          <a:chExt cx="0" cy="0"/>
+        </a:xfrm>
+      </p:grpSpPr>
+      <p:sp>
+        <p:nvSpPr>
+          <p:cNvPr id="4" name="Title 3"/>
+          <p:cNvSpPr>
+            <a:spLocks noGrp="1"/>
+          </p:cNvSpPr>
+          <p:nvPr>
+            <p:ph type="title"/>
+          </p:nvPr>
+        </p:nvSpPr>
+        <p:spPr/>
+        <p:txBody>
+          <a:bodyPr/>
+          <a:lstStyle/>
+          <a:p>
+            <a:r>
+              <a:rPr lang="en-US" dirty="0" smtClean="0"/>
+              <a:t>Thoughts on </a:t>
+            </a:r>
+            <a:r>
+              <a:rPr lang="en-US" dirty="0" err="1" smtClean="0"/>
+              <a:t>Xamarin.Forms</a:t>
+            </a:r>
+            <a:endParaRPr lang="en-US" dirty="0"/>
+          </a:p>
+        </p:txBody>
+      </p:sp>
+      <p:sp>
+        <p:nvSpPr>
+          <p:cNvPr id="5" name="Text Placeholder 4"/>
+          <p:cNvSpPr>
+            <a:spLocks noGrp="1"/>
+          </p:cNvSpPr>
+          <p:nvPr>
+            <p:ph type="body" idx="1"/>
+          </p:nvPr>
+        </p:nvSpPr>
+        <p:spPr/>
+        <p:txBody>
+          <a:bodyPr/>
+          <a:lstStyle/>
+          <a:p>
+            <a:endParaRPr lang="en-US"/>
+          </a:p>
+        </p:txBody>
+      </p:sp>
+    </p:spTree>
+    <p:extLst>
+      <p:ext uri="{BB962C8B-B14F-4D97-AF65-F5344CB8AC3E}">
+        <p14:creationId xmlns:p14="http://schemas.microsoft.com/office/powerpoint/2010/main" val="3653969678"/>
+      </p:ext>
+    </p:extLst>
+  </p:cSld>
+  <p:clrMapOvr>
+    <a:masterClrMapping/>
+  </p:clrMapOvr>
+  <p:timing>
+    <p:tnLst>
+      <p:par>
+        <p:cTn id="1" dur="indefinite" restart="never" nodeType="tmRoot"/>
+      </p:par>
+    </p:tnLst>
+  </p:timing>
+</p:sld>
+</file>
+
+<file path=ppt/slides/slide41.xml><?xml version="1.0" encoding="utf-8"?>
 <p:sld xmlns:a="http://schemas.openxmlformats.org/drawingml/2006/main" xmlns:r="http://schemas.openxmlformats.org/officeDocument/2006/relationships" xmlns:p="http://schemas.openxmlformats.org/presentationml/2006/main">
   <p:cSld>
     <p:spTree>
@@ -34912,7 +35028,7 @@
 </p:sld>
 </file>
 
-<file path=ppt/slides/slide41.xml><?xml version="1.0" encoding="utf-8"?>
+<file path=ppt/slides/slide42.xml><?xml version="1.0" encoding="utf-8"?>
 <p:sld xmlns:a="http://schemas.openxmlformats.org/drawingml/2006/main" xmlns:r="http://schemas.openxmlformats.org/officeDocument/2006/relationships" xmlns:p="http://schemas.openxmlformats.org/presentationml/2006/main">
   <p:cSld>
     <p:spTree>
@@ -34986,9 +35102,12 @@
           <a:p>
             <a:r>
               <a:rPr lang="en-US" dirty="0" smtClean="0"/>
-              <a:t>More challenging to customize UI</a:t>
+              <a:t>More challenging to customize </a:t>
             </a:r>
-            <a:endParaRPr lang="en-US" dirty="0"/>
+            <a:r>
+              <a:rPr lang="en-US" dirty="0" smtClean="0"/>
+              <a:t>UI</a:t>
+            </a:r>
           </a:p>
         </p:txBody>
       </p:sp>
@@ -35212,7 +35331,7 @@
 </p:sld>
 </file>
 
-<file path=ppt/slides/slide42.xml><?xml version="1.0" encoding="utf-8"?>
+<file path=ppt/slides/slide43.xml><?xml version="1.0" encoding="utf-8"?>
 <p:sld xmlns:a="http://schemas.openxmlformats.org/drawingml/2006/main" xmlns:r="http://schemas.openxmlformats.org/officeDocument/2006/relationships" xmlns:p="http://schemas.openxmlformats.org/presentationml/2006/main">
   <p:cSld>
     <p:spTree>
@@ -37352,7 +37471,7 @@
 </p:sld>
 </file>
 
-<file path=ppt/slides/slide43.xml><?xml version="1.0" encoding="utf-8"?>
+<file path=ppt/slides/slide44.xml><?xml version="1.0" encoding="utf-8"?>
 <p:sld xmlns:a="http://schemas.openxmlformats.org/drawingml/2006/main" xmlns:r="http://schemas.openxmlformats.org/officeDocument/2006/relationships" xmlns:p="http://schemas.openxmlformats.org/presentationml/2006/main">
   <p:cSld>
     <p:spTree>
@@ -37660,7 +37779,7 @@
 </p:sld>
 </file>
 
-<file path=ppt/slides/slide44.xml><?xml version="1.0" encoding="utf-8"?>
+<file path=ppt/slides/slide45.xml><?xml version="1.0" encoding="utf-8"?>
 <p:sld xmlns:a="http://schemas.openxmlformats.org/drawingml/2006/main" xmlns:r="http://schemas.openxmlformats.org/officeDocument/2006/relationships" xmlns:p="http://schemas.openxmlformats.org/presentationml/2006/main">
   <p:cSld>
     <p:spTree>

</xml_diff>